<commit_message>
improved the ER diagram
</commit_message>
<xml_diff>
--- a/VisMiner/docs/Visminer-presentation.pptx
+++ b/VisMiner/docs/Visminer-presentation.pptx
@@ -239,7 +239,7 @@
           <a:p>
             <a:fld id="{08770929-4793-7446-8E37-657241E7C1FC}" type="datetimeFigureOut">
               <a:rPr lang="en-US" smtClean="0"/>
-              <a:t>4/27/14</a:t>
+              <a:t>5/13/14</a:t>
             </a:fld>
             <a:endParaRPr lang="pt-PT"/>
           </a:p>
@@ -873,7 +873,7 @@
           <a:p>
             <a:fld id="{08770929-4793-7446-8E37-657241E7C1FC}" type="datetimeFigureOut">
               <a:rPr lang="en-US" smtClean="0"/>
-              <a:t>4/27/14</a:t>
+              <a:t>5/13/14</a:t>
             </a:fld>
             <a:endParaRPr lang="pt-PT"/>
           </a:p>
@@ -1150,7 +1150,7 @@
           <a:p>
             <a:fld id="{08770929-4793-7446-8E37-657241E7C1FC}" type="datetimeFigureOut">
               <a:rPr lang="en-US" smtClean="0"/>
-              <a:t>4/27/14</a:t>
+              <a:t>5/13/14</a:t>
             </a:fld>
             <a:endParaRPr lang="pt-PT"/>
           </a:p>
@@ -1315,7 +1315,7 @@
           <a:p>
             <a:fld id="{08770929-4793-7446-8E37-657241E7C1FC}" type="datetimeFigureOut">
               <a:rPr lang="en-US" smtClean="0"/>
-              <a:t>4/27/14</a:t>
+              <a:t>5/13/14</a:t>
             </a:fld>
             <a:endParaRPr lang="pt-PT"/>
           </a:p>
@@ -1496,7 +1496,7 @@
           <a:p>
             <a:fld id="{08770929-4793-7446-8E37-657241E7C1FC}" type="datetimeFigureOut">
               <a:rPr lang="en-US" smtClean="0"/>
-              <a:t>4/27/14</a:t>
+              <a:t>5/13/14</a:t>
             </a:fld>
             <a:endParaRPr lang="pt-PT"/>
           </a:p>
@@ -2141,7 +2141,7 @@
           <a:p>
             <a:fld id="{08770929-4793-7446-8E37-657241E7C1FC}" type="datetimeFigureOut">
               <a:rPr lang="en-US" smtClean="0"/>
-              <a:t>4/27/14</a:t>
+              <a:t>5/13/14</a:t>
             </a:fld>
             <a:endParaRPr lang="pt-PT"/>
           </a:p>
@@ -2567,7 +2567,7 @@
           <a:p>
             <a:fld id="{08770929-4793-7446-8E37-657241E7C1FC}" type="datetimeFigureOut">
               <a:rPr lang="en-US" smtClean="0"/>
-              <a:t>4/27/14</a:t>
+              <a:t>5/13/14</a:t>
             </a:fld>
             <a:endParaRPr lang="pt-PT"/>
           </a:p>
@@ -2680,7 +2680,7 @@
           <a:p>
             <a:fld id="{08770929-4793-7446-8E37-657241E7C1FC}" type="datetimeFigureOut">
               <a:rPr lang="en-US" smtClean="0"/>
-              <a:t>4/27/14</a:t>
+              <a:t>5/13/14</a:t>
             </a:fld>
             <a:endParaRPr lang="pt-PT"/>
           </a:p>
@@ -2861,7 +2861,7 @@
           <a:p>
             <a:fld id="{08770929-4793-7446-8E37-657241E7C1FC}" type="datetimeFigureOut">
               <a:rPr lang="en-US" smtClean="0"/>
-              <a:t>4/27/14</a:t>
+              <a:t>5/13/14</a:t>
             </a:fld>
             <a:endParaRPr lang="pt-PT"/>
           </a:p>
@@ -3127,7 +3127,7 @@
           <a:p>
             <a:fld id="{08770929-4793-7446-8E37-657241E7C1FC}" type="datetimeFigureOut">
               <a:rPr lang="en-US" smtClean="0"/>
-              <a:t>4/27/14</a:t>
+              <a:t>5/13/14</a:t>
             </a:fld>
             <a:endParaRPr lang="pt-PT"/>
           </a:p>
@@ -3598,7 +3598,7 @@
           <a:p>
             <a:fld id="{08770929-4793-7446-8E37-657241E7C1FC}" type="datetimeFigureOut">
               <a:rPr lang="en-US" smtClean="0"/>
-              <a:t>4/27/14</a:t>
+              <a:t>5/13/14</a:t>
             </a:fld>
             <a:endParaRPr lang="pt-PT"/>
           </a:p>
@@ -4158,7 +4158,7 @@
           <a:p>
             <a:fld id="{08770929-4793-7446-8E37-657241E7C1FC}" type="datetimeFigureOut">
               <a:rPr lang="en-US" smtClean="0"/>
-              <a:t>4/27/14</a:t>
+              <a:t>5/13/14</a:t>
             </a:fld>
             <a:endParaRPr lang="pt-PT"/>
           </a:p>
@@ -4848,7 +4848,15 @@
             </a:r>
             <a:r>
               <a:rPr lang="en-US" dirty="0" smtClean="0"/>
-              <a:t> is a tool that aims to help on software comprehension though the use of</a:t>
+              <a:t> is a tool that aims to help on software comprehension </a:t>
+            </a:r>
+            <a:r>
+              <a:rPr lang="en-US" dirty="0" smtClean="0"/>
+              <a:t>through </a:t>
+            </a:r>
+            <a:r>
+              <a:rPr lang="en-US" dirty="0" smtClean="0"/>
+              <a:t>the use of</a:t>
             </a:r>
           </a:p>
           <a:p>
@@ -4938,8 +4946,8 @@
         </p:nvSpPr>
         <p:spPr>
           <a:xfrm>
-            <a:off x="457200" y="2512438"/>
-            <a:ext cx="1208759" cy="1187946"/>
+            <a:off x="339072" y="2999782"/>
+            <a:ext cx="1359049" cy="1187946"/>
           </a:xfrm>
           <a:prstGeom prst="flowChartMagneticDisk">
             <a:avLst/>
@@ -4987,7 +4995,7 @@
         </p:nvSpPr>
         <p:spPr>
           <a:xfrm>
-            <a:off x="2512594" y="1720474"/>
+            <a:off x="2394466" y="2207818"/>
             <a:ext cx="2266797" cy="936554"/>
           </a:xfrm>
           <a:prstGeom prst="roundRect">
@@ -5032,8 +5040,8 @@
         </p:nvCxnSpPr>
         <p:spPr>
           <a:xfrm rot="5400000" flipH="1" flipV="1">
-            <a:off x="1625244" y="1625088"/>
-            <a:ext cx="323687" cy="1451014"/>
+            <a:off x="1544688" y="2150005"/>
+            <a:ext cx="323687" cy="1375869"/>
           </a:xfrm>
           <a:prstGeom prst="bentConnector2">
             <a:avLst/>
@@ -5066,8 +5074,8 @@
         </p:nvSpPr>
         <p:spPr>
           <a:xfrm>
-            <a:off x="1061580" y="1706163"/>
-            <a:ext cx="1312566" cy="369332"/>
+            <a:off x="723548" y="2193507"/>
+            <a:ext cx="1670918" cy="369332"/>
           </a:xfrm>
           <a:prstGeom prst="rect">
             <a:avLst/>
@@ -5075,16 +5083,16 @@
           <a:noFill/>
         </p:spPr>
         <p:txBody>
-          <a:bodyPr wrap="none" rtlCol="0">
+          <a:bodyPr wrap="square" rtlCol="0">
             <a:spAutoFit/>
           </a:bodyPr>
           <a:lstStyle/>
           <a:p>
             <a:r>
-              <a:rPr lang="en-US" smtClean="0"/>
+              <a:rPr lang="en-US" dirty="0" smtClean="0"/>
               <a:t>Extract data</a:t>
             </a:r>
-            <a:endParaRPr lang="en-US"/>
+            <a:endParaRPr lang="en-US" dirty="0"/>
           </a:p>
         </p:txBody>
       </p:sp>
@@ -5096,8 +5104,8 @@
         </p:nvSpPr>
         <p:spPr>
           <a:xfrm>
-            <a:off x="7839653" y="3830107"/>
-            <a:ext cx="1208759" cy="1187946"/>
+            <a:off x="7589855" y="4317451"/>
+            <a:ext cx="1340430" cy="1187946"/>
           </a:xfrm>
           <a:prstGeom prst="flowChartMagneticDisk">
             <a:avLst/>
@@ -5145,7 +5153,7 @@
         </p:nvSpPr>
         <p:spPr>
           <a:xfrm>
-            <a:off x="5434852" y="1706819"/>
+            <a:off x="5316724" y="2194163"/>
             <a:ext cx="1747891" cy="819271"/>
           </a:xfrm>
           <a:prstGeom prst="roundRect">
@@ -5190,8 +5198,8 @@
         </p:nvCxnSpPr>
         <p:spPr>
           <a:xfrm>
-            <a:off x="7182743" y="2116455"/>
-            <a:ext cx="1261290" cy="1713652"/>
+            <a:off x="7064615" y="2603799"/>
+            <a:ext cx="1195455" cy="1713652"/>
           </a:xfrm>
           <a:prstGeom prst="bentConnector2">
             <a:avLst/>
@@ -5223,7 +5231,7 @@
         </p:nvSpPr>
         <p:spPr>
           <a:xfrm>
-            <a:off x="6965701" y="2657027"/>
+            <a:off x="6773743" y="3144371"/>
             <a:ext cx="1529423" cy="646331"/>
           </a:xfrm>
           <a:prstGeom prst="rect">
@@ -5264,7 +5272,7 @@
         </p:nvCxnSpPr>
         <p:spPr>
           <a:xfrm flipV="1">
-            <a:off x="4779391" y="2116455"/>
+            <a:off x="4661263" y="2603799"/>
             <a:ext cx="655461" cy="72296"/>
           </a:xfrm>
           <a:prstGeom prst="bentConnector3">
@@ -5299,7 +5307,7 @@
         </p:nvSpPr>
         <p:spPr>
           <a:xfrm>
-            <a:off x="3031500" y="4014445"/>
+            <a:off x="2913372" y="4501789"/>
             <a:ext cx="1747891" cy="819271"/>
           </a:xfrm>
           <a:prstGeom prst="roundRect">
@@ -5344,12 +5352,12 @@
         </p:nvCxnSpPr>
         <p:spPr>
           <a:xfrm rot="10800000">
-            <a:off x="3905447" y="4014446"/>
-            <a:ext cx="3934207" cy="409635"/>
+            <a:off x="3787319" y="4501790"/>
+            <a:ext cx="3802537" cy="409635"/>
           </a:xfrm>
           <a:prstGeom prst="bentConnector4">
             <a:avLst>
-              <a:gd name="adj1" fmla="val 38893"/>
+              <a:gd name="adj1" fmla="val 38508"/>
               <a:gd name="adj2" fmla="val 155806"/>
             </a:avLst>
           </a:prstGeom>
@@ -5920,7 +5928,7 @@
           <a:p>
             <a:r>
               <a:rPr lang="en-US" dirty="0" smtClean="0"/>
-              <a:t>Download </a:t>
+              <a:t>Fork the </a:t>
             </a:r>
             <a:r>
               <a:rPr lang="en-US" dirty="0" err="1" smtClean="0"/>
@@ -5928,18 +5936,32 @@
             </a:r>
             <a:r>
               <a:rPr lang="en-US" dirty="0" smtClean="0"/>
-              <a:t> from </a:t>
+              <a:t> </a:t>
             </a:r>
             <a:r>
               <a:rPr lang="en-US" dirty="0" err="1" smtClean="0"/>
               <a:t>GitHub</a:t>
             </a:r>
+            <a:r>
+              <a:rPr lang="en-US" dirty="0" smtClean="0"/>
+              <a:t> repository</a:t>
+            </a:r>
+          </a:p>
+          <a:p>
+            <a:r>
+              <a:rPr lang="en-US" dirty="0" smtClean="0"/>
+              <a:t>Clone it</a:t>
+            </a:r>
             <a:endParaRPr lang="en-US" dirty="0" smtClean="0"/>
           </a:p>
           <a:p>
             <a:r>
               <a:rPr lang="en-US" dirty="0" smtClean="0"/>
-              <a:t>Follow the install directions on </a:t>
+              <a:t>Follow </a:t>
+            </a:r>
+            <a:r>
+              <a:rPr lang="en-US" dirty="0" smtClean="0"/>
+              <a:t>the install directions on </a:t>
             </a:r>
             <a:r>
               <a:rPr lang="en-US" dirty="0" err="1" smtClean="0"/>
@@ -5953,8 +5975,31 @@
           <a:p>
             <a:r>
               <a:rPr lang="en-US" dirty="0" smtClean="0"/>
-              <a:t>Use it on your project</a:t>
-            </a:r>
+              <a:t>Use it on your </a:t>
+            </a:r>
+            <a:r>
+              <a:rPr lang="en-US" dirty="0" smtClean="0"/>
+              <a:t>project</a:t>
+            </a:r>
+            <a:r>
+              <a:rPr lang="en-US" dirty="0"/>
+              <a:t> </a:t>
+            </a:r>
+            <a:r>
+              <a:rPr lang="en-US" dirty="0" smtClean="0"/>
+              <a:t>or Evolve it</a:t>
+            </a:r>
+          </a:p>
+          <a:p>
+            <a:r>
+              <a:rPr lang="en-US" dirty="0" smtClean="0"/>
+              <a:t>When evolved, push to your repository and request for </a:t>
+            </a:r>
+            <a:r>
+              <a:rPr lang="en-US" smtClean="0"/>
+              <a:t>a pull</a:t>
+            </a:r>
+            <a:endParaRPr lang="en-US" dirty="0" smtClean="0"/>
           </a:p>
         </p:txBody>
       </p:sp>

</xml_diff>